<commit_message>
Updated with the latest comments.
</commit_message>
<xml_diff>
--- a/journalWallFriction/pictures/pdf/anypolygon2.pptx
+++ b/journalWallFriction/pictures/pdf/anypolygon2.pptx
@@ -243,7 +243,7 @@
           <a:p>
             <a:fld id="{B3D1CF3D-C589-634F-8074-9A077527675E}" type="datetimeFigureOut">
               <a:rPr lang="en-US" smtClean="0"/>
-              <a:t>4/24/18</a:t>
+              <a:t>5/29/18</a:t>
             </a:fld>
             <a:endParaRPr lang="en-US"/>
           </a:p>
@@ -408,7 +408,7 @@
           <a:p>
             <a:fld id="{B3D1CF3D-C589-634F-8074-9A077527675E}" type="datetimeFigureOut">
               <a:rPr lang="en-US" smtClean="0"/>
-              <a:t>4/24/18</a:t>
+              <a:t>5/29/18</a:t>
             </a:fld>
             <a:endParaRPr lang="en-US"/>
           </a:p>
@@ -583,7 +583,7 @@
           <a:p>
             <a:fld id="{B3D1CF3D-C589-634F-8074-9A077527675E}" type="datetimeFigureOut">
               <a:rPr lang="en-US" smtClean="0"/>
-              <a:t>4/24/18</a:t>
+              <a:t>5/29/18</a:t>
             </a:fld>
             <a:endParaRPr lang="en-US"/>
           </a:p>
@@ -748,7 +748,7 @@
           <a:p>
             <a:fld id="{B3D1CF3D-C589-634F-8074-9A077527675E}" type="datetimeFigureOut">
               <a:rPr lang="en-US" smtClean="0"/>
-              <a:t>4/24/18</a:t>
+              <a:t>5/29/18</a:t>
             </a:fld>
             <a:endParaRPr lang="en-US"/>
           </a:p>
@@ -987,7 +987,7 @@
           <a:p>
             <a:fld id="{B3D1CF3D-C589-634F-8074-9A077527675E}" type="datetimeFigureOut">
               <a:rPr lang="en-US" smtClean="0"/>
-              <a:t>4/24/18</a:t>
+              <a:t>5/29/18</a:t>
             </a:fld>
             <a:endParaRPr lang="en-US"/>
           </a:p>
@@ -1214,7 +1214,7 @@
           <a:p>
             <a:fld id="{B3D1CF3D-C589-634F-8074-9A077527675E}" type="datetimeFigureOut">
               <a:rPr lang="en-US" smtClean="0"/>
-              <a:t>4/24/18</a:t>
+              <a:t>5/29/18</a:t>
             </a:fld>
             <a:endParaRPr lang="en-US"/>
           </a:p>
@@ -1576,7 +1576,7 @@
           <a:p>
             <a:fld id="{B3D1CF3D-C589-634F-8074-9A077527675E}" type="datetimeFigureOut">
               <a:rPr lang="en-US" smtClean="0"/>
-              <a:t>4/24/18</a:t>
+              <a:t>5/29/18</a:t>
             </a:fld>
             <a:endParaRPr lang="en-US"/>
           </a:p>
@@ -1689,7 +1689,7 @@
           <a:p>
             <a:fld id="{B3D1CF3D-C589-634F-8074-9A077527675E}" type="datetimeFigureOut">
               <a:rPr lang="en-US" smtClean="0"/>
-              <a:t>4/24/18</a:t>
+              <a:t>5/29/18</a:t>
             </a:fld>
             <a:endParaRPr lang="en-US"/>
           </a:p>
@@ -1779,7 +1779,7 @@
           <a:p>
             <a:fld id="{B3D1CF3D-C589-634F-8074-9A077527675E}" type="datetimeFigureOut">
               <a:rPr lang="en-US" smtClean="0"/>
-              <a:t>4/24/18</a:t>
+              <a:t>5/29/18</a:t>
             </a:fld>
             <a:endParaRPr lang="en-US"/>
           </a:p>
@@ -2051,7 +2051,7 @@
           <a:p>
             <a:fld id="{B3D1CF3D-C589-634F-8074-9A077527675E}" type="datetimeFigureOut">
               <a:rPr lang="en-US" smtClean="0"/>
-              <a:t>4/24/18</a:t>
+              <a:t>5/29/18</a:t>
             </a:fld>
             <a:endParaRPr lang="en-US"/>
           </a:p>
@@ -2303,7 +2303,7 @@
           <a:p>
             <a:fld id="{B3D1CF3D-C589-634F-8074-9A077527675E}" type="datetimeFigureOut">
               <a:rPr lang="en-US" smtClean="0"/>
-              <a:t>4/24/18</a:t>
+              <a:t>5/29/18</a:t>
             </a:fld>
             <a:endParaRPr lang="en-US"/>
           </a:p>
@@ -2511,7 +2511,7 @@
           <a:p>
             <a:fld id="{B3D1CF3D-C589-634F-8074-9A077527675E}" type="datetimeFigureOut">
               <a:rPr lang="en-US" smtClean="0"/>
-              <a:t>4/24/18</a:t>
+              <a:t>5/29/18</a:t>
             </a:fld>
             <a:endParaRPr lang="en-US"/>
           </a:p>
@@ -4174,6 +4174,92 @@
           </a:p>
         </p:txBody>
       </p:sp>
+      <p:cxnSp>
+        <p:nvCxnSpPr>
+          <p:cNvPr id="37" name="Straight Arrow Connector 36">
+            <a:extLst>
+              <a:ext uri="{FF2B5EF4-FFF2-40B4-BE49-F238E27FC236}">
+                <a16:creationId xmlns:a16="http://schemas.microsoft.com/office/drawing/2014/main" id="{820FE49D-B975-4746-8007-9748E72E4F78}"/>
+              </a:ext>
+            </a:extLst>
+          </p:cNvPr>
+          <p:cNvCxnSpPr/>
+          <p:nvPr/>
+        </p:nvCxnSpPr>
+        <p:spPr>
+          <a:xfrm flipH="1" flipV="1">
+            <a:off x="498337" y="1839572"/>
+            <a:ext cx="520528" cy="379676"/>
+          </a:xfrm>
+          <a:prstGeom prst="straightConnector1">
+            <a:avLst/>
+          </a:prstGeom>
+          <a:ln w="25400">
+            <a:solidFill>
+              <a:srgbClr val="00FF00"/>
+            </a:solidFill>
+            <a:prstDash val="dash"/>
+            <a:tailEnd type="stealth"/>
+          </a:ln>
+        </p:spPr>
+        <p:style>
+          <a:lnRef idx="1">
+            <a:schemeClr val="accent1"/>
+          </a:lnRef>
+          <a:fillRef idx="0">
+            <a:schemeClr val="accent1"/>
+          </a:fillRef>
+          <a:effectRef idx="0">
+            <a:schemeClr val="accent1"/>
+          </a:effectRef>
+          <a:fontRef idx="minor">
+            <a:schemeClr val="tx1"/>
+          </a:fontRef>
+        </p:style>
+      </p:cxnSp>
+      <p:cxnSp>
+        <p:nvCxnSpPr>
+          <p:cNvPr id="3" name="Straight Connector 2">
+            <a:extLst>
+              <a:ext uri="{FF2B5EF4-FFF2-40B4-BE49-F238E27FC236}">
+                <a16:creationId xmlns:a16="http://schemas.microsoft.com/office/drawing/2014/main" id="{572DDDDF-9B65-9C47-AD9A-904C67A6B96B}"/>
+              </a:ext>
+            </a:extLst>
+          </p:cNvPr>
+          <p:cNvCxnSpPr>
+            <a:cxnSpLocks/>
+          </p:cNvCxnSpPr>
+          <p:nvPr/>
+        </p:nvCxnSpPr>
+        <p:spPr>
+          <a:xfrm flipH="1">
+            <a:off x="474769" y="1833087"/>
+            <a:ext cx="30053" cy="499697"/>
+          </a:xfrm>
+          <a:prstGeom prst="line">
+            <a:avLst/>
+          </a:prstGeom>
+          <a:ln w="57150">
+            <a:solidFill>
+              <a:srgbClr val="00B050"/>
+            </a:solidFill>
+          </a:ln>
+        </p:spPr>
+        <p:style>
+          <a:lnRef idx="1">
+            <a:schemeClr val="accent1"/>
+          </a:lnRef>
+          <a:fillRef idx="0">
+            <a:schemeClr val="accent1"/>
+          </a:fillRef>
+          <a:effectRef idx="0">
+            <a:schemeClr val="accent1"/>
+          </a:effectRef>
+          <a:fontRef idx="minor">
+            <a:schemeClr val="tx1"/>
+          </a:fontRef>
+        </p:style>
+      </p:cxnSp>
     </p:spTree>
     <p:extLst>
       <p:ext uri="{BB962C8B-B14F-4D97-AF65-F5344CB8AC3E}">

</xml_diff>